<commit_message>
nueva imagen power modificado
</commit_message>
<xml_diff>
--- a/Presentation1.pptx
+++ b/Presentation1.pptx
@@ -10,9 +10,10 @@
     <p:sldId id="262" r:id="rId4"/>
     <p:sldId id="257" r:id="rId5"/>
     <p:sldId id="258" r:id="rId6"/>
-    <p:sldId id="259" r:id="rId7"/>
-    <p:sldId id="260" r:id="rId8"/>
-    <p:sldId id="261" r:id="rId9"/>
+    <p:sldId id="264" r:id="rId7"/>
+    <p:sldId id="259" r:id="rId8"/>
+    <p:sldId id="260" r:id="rId9"/>
+    <p:sldId id="261" r:id="rId10"/>
   </p:sldIdLst>
   <p:sldSz cx="12192000" cy="6858000"/>
   <p:notesSz cx="6858000" cy="9144000"/>
@@ -111,6 +112,11 @@
       </a:defRPr>
     </a:lvl9pPr>
   </p:defaultTextStyle>
+  <p:extLst>
+    <p:ext uri="{EFAFB233-063F-42B5-8137-9DF3F51BA10A}">
+      <p15:sldGuideLst xmlns:p15="http://schemas.microsoft.com/office/powerpoint/2012/main"/>
+    </p:ext>
+  </p:extLst>
 </p:presentation>
 </file>
 
@@ -261,7 +267,7 @@
           <a:p>
             <a:fld id="{6DF5B01C-17E8-437B-A238-E1569DEBDDEF}" type="datetimeFigureOut">
               <a:rPr lang="en-US" smtClean="0"/>
-              <a:t>1/31/2023</a:t>
+              <a:t>2/1/2023</a:t>
             </a:fld>
             <a:endParaRPr lang="en-US"/>
           </a:p>
@@ -459,7 +465,7 @@
           <a:p>
             <a:fld id="{6DF5B01C-17E8-437B-A238-E1569DEBDDEF}" type="datetimeFigureOut">
               <a:rPr lang="en-US" smtClean="0"/>
-              <a:t>1/31/2023</a:t>
+              <a:t>2/1/2023</a:t>
             </a:fld>
             <a:endParaRPr lang="en-US"/>
           </a:p>
@@ -667,7 +673,7 @@
           <a:p>
             <a:fld id="{6DF5B01C-17E8-437B-A238-E1569DEBDDEF}" type="datetimeFigureOut">
               <a:rPr lang="en-US" smtClean="0"/>
-              <a:t>1/31/2023</a:t>
+              <a:t>2/1/2023</a:t>
             </a:fld>
             <a:endParaRPr lang="en-US"/>
           </a:p>
@@ -865,7 +871,7 @@
           <a:p>
             <a:fld id="{6DF5B01C-17E8-437B-A238-E1569DEBDDEF}" type="datetimeFigureOut">
               <a:rPr lang="en-US" smtClean="0"/>
-              <a:t>1/31/2023</a:t>
+              <a:t>2/1/2023</a:t>
             </a:fld>
             <a:endParaRPr lang="en-US"/>
           </a:p>
@@ -1140,7 +1146,7 @@
           <a:p>
             <a:fld id="{6DF5B01C-17E8-437B-A238-E1569DEBDDEF}" type="datetimeFigureOut">
               <a:rPr lang="en-US" smtClean="0"/>
-              <a:t>1/31/2023</a:t>
+              <a:t>2/1/2023</a:t>
             </a:fld>
             <a:endParaRPr lang="en-US"/>
           </a:p>
@@ -1405,7 +1411,7 @@
           <a:p>
             <a:fld id="{6DF5B01C-17E8-437B-A238-E1569DEBDDEF}" type="datetimeFigureOut">
               <a:rPr lang="en-US" smtClean="0"/>
-              <a:t>1/31/2023</a:t>
+              <a:t>2/1/2023</a:t>
             </a:fld>
             <a:endParaRPr lang="en-US"/>
           </a:p>
@@ -1817,7 +1823,7 @@
           <a:p>
             <a:fld id="{6DF5B01C-17E8-437B-A238-E1569DEBDDEF}" type="datetimeFigureOut">
               <a:rPr lang="en-US" smtClean="0"/>
-              <a:t>1/31/2023</a:t>
+              <a:t>2/1/2023</a:t>
             </a:fld>
             <a:endParaRPr lang="en-US"/>
           </a:p>
@@ -1958,7 +1964,7 @@
           <a:p>
             <a:fld id="{6DF5B01C-17E8-437B-A238-E1569DEBDDEF}" type="datetimeFigureOut">
               <a:rPr lang="en-US" smtClean="0"/>
-              <a:t>1/31/2023</a:t>
+              <a:t>2/1/2023</a:t>
             </a:fld>
             <a:endParaRPr lang="en-US"/>
           </a:p>
@@ -2071,7 +2077,7 @@
           <a:p>
             <a:fld id="{6DF5B01C-17E8-437B-A238-E1569DEBDDEF}" type="datetimeFigureOut">
               <a:rPr lang="en-US" smtClean="0"/>
-              <a:t>1/31/2023</a:t>
+              <a:t>2/1/2023</a:t>
             </a:fld>
             <a:endParaRPr lang="en-US"/>
           </a:p>
@@ -2382,7 +2388,7 @@
           <a:p>
             <a:fld id="{6DF5B01C-17E8-437B-A238-E1569DEBDDEF}" type="datetimeFigureOut">
               <a:rPr lang="en-US" smtClean="0"/>
-              <a:t>1/31/2023</a:t>
+              <a:t>2/1/2023</a:t>
             </a:fld>
             <a:endParaRPr lang="en-US"/>
           </a:p>
@@ -2670,7 +2676,7 @@
           <a:p>
             <a:fld id="{6DF5B01C-17E8-437B-A238-E1569DEBDDEF}" type="datetimeFigureOut">
               <a:rPr lang="en-US" smtClean="0"/>
-              <a:t>1/31/2023</a:t>
+              <a:t>2/1/2023</a:t>
             </a:fld>
             <a:endParaRPr lang="en-US"/>
           </a:p>
@@ -2911,7 +2917,7 @@
           <a:p>
             <a:fld id="{6DF5B01C-17E8-437B-A238-E1569DEBDDEF}" type="datetimeFigureOut">
               <a:rPr lang="en-US" smtClean="0"/>
-              <a:t>1/31/2023</a:t>
+              <a:t>2/1/2023</a:t>
             </a:fld>
             <a:endParaRPr lang="en-US"/>
           </a:p>
@@ -4704,6 +4710,41 @@
       </p:grpSpPr>
       <p:pic>
         <p:nvPicPr>
+          <p:cNvPr id="7" name="Picture 6" descr="Text&#10;&#10;Description automatically generated with low confidence">
+            <a:extLst>
+              <a:ext uri="{FF2B5EF4-FFF2-40B4-BE49-F238E27FC236}">
+                <a16:creationId xmlns:a16="http://schemas.microsoft.com/office/drawing/2014/main" id="{6474B880-5647-7CFD-5888-30C38CAA82C7}"/>
+              </a:ext>
+            </a:extLst>
+          </p:cNvPr>
+          <p:cNvPicPr>
+            <a:picLocks noChangeAspect="1"/>
+          </p:cNvPicPr>
+          <p:nvPr/>
+        </p:nvPicPr>
+        <p:blipFill rotWithShape="1">
+          <a:blip r:embed="rId2">
+            <a:extLst>
+              <a:ext uri="{28A0092B-C50C-407E-A947-70E740481C1C}">
+                <a14:useLocalDpi xmlns:a14="http://schemas.microsoft.com/office/drawing/2010/main" val="0"/>
+              </a:ext>
+            </a:extLst>
+          </a:blip>
+          <a:srcRect t="81852" r="74890"/>
+          <a:stretch/>
+        </p:blipFill>
+        <p:spPr>
+          <a:xfrm>
+            <a:off x="4080320" y="4840891"/>
+            <a:ext cx="3958772" cy="2145925"/>
+          </a:xfrm>
+          <a:prstGeom prst="rect">
+            <a:avLst/>
+          </a:prstGeom>
+        </p:spPr>
+      </p:pic>
+      <p:pic>
+        <p:nvPicPr>
           <p:cNvPr id="5" name="Picture 4" descr="Logo&#10;&#10;Description automatically generated">
             <a:extLst>
               <a:ext uri="{FF2B5EF4-FFF2-40B4-BE49-F238E27FC236}">
@@ -4717,7 +4758,7 @@
           <p:nvPr/>
         </p:nvPicPr>
         <p:blipFill>
-          <a:blip r:embed="rId2">
+          <a:blip r:embed="rId3">
             <a:extLst>
               <a:ext uri="{28A0092B-C50C-407E-A947-70E740481C1C}">
                 <a14:useLocalDpi xmlns:a14="http://schemas.microsoft.com/office/drawing/2010/main" val="0"/>
@@ -4730,8 +4771,78 @@
         </p:blipFill>
         <p:spPr>
           <a:xfrm>
-            <a:off x="3810000" y="1039585"/>
+            <a:off x="3706585" y="377371"/>
             <a:ext cx="4778829" cy="4778829"/>
+          </a:xfrm>
+          <a:prstGeom prst="rect">
+            <a:avLst/>
+          </a:prstGeom>
+        </p:spPr>
+      </p:pic>
+      <p:pic>
+        <p:nvPicPr>
+          <p:cNvPr id="3" name="Picture 2" descr="A picture containing text&#10;&#10;Description automatically generated">
+            <a:extLst>
+              <a:ext uri="{FF2B5EF4-FFF2-40B4-BE49-F238E27FC236}">
+                <a16:creationId xmlns:a16="http://schemas.microsoft.com/office/drawing/2014/main" id="{B6F1D58F-15A9-6BAE-92AD-9EE9B62BFBCB}"/>
+              </a:ext>
+            </a:extLst>
+          </p:cNvPr>
+          <p:cNvPicPr>
+            <a:picLocks noChangeAspect="1"/>
+          </p:cNvPicPr>
+          <p:nvPr/>
+        </p:nvPicPr>
+        <p:blipFill rotWithShape="1">
+          <a:blip r:embed="rId4">
+            <a:extLst>
+              <a:ext uri="{28A0092B-C50C-407E-A947-70E740481C1C}">
+                <a14:useLocalDpi xmlns:a14="http://schemas.microsoft.com/office/drawing/2010/main" val="0"/>
+              </a:ext>
+            </a:extLst>
+          </a:blip>
+          <a:srcRect l="36111" r="47593" b="70370"/>
+          <a:stretch/>
+        </p:blipFill>
+        <p:spPr>
+          <a:xfrm rot="2719188">
+            <a:off x="8692747" y="1327084"/>
+            <a:ext cx="1312621" cy="2386584"/>
+          </a:xfrm>
+          <a:prstGeom prst="rect">
+            <a:avLst/>
+          </a:prstGeom>
+        </p:spPr>
+      </p:pic>
+      <p:pic>
+        <p:nvPicPr>
+          <p:cNvPr id="9" name="Picture 8" descr="A picture containing text&#10;&#10;Description automatically generated">
+            <a:extLst>
+              <a:ext uri="{FF2B5EF4-FFF2-40B4-BE49-F238E27FC236}">
+                <a16:creationId xmlns:a16="http://schemas.microsoft.com/office/drawing/2014/main" id="{A813C248-2D03-7FFA-9726-F6DB97677BCA}"/>
+              </a:ext>
+            </a:extLst>
+          </p:cNvPr>
+          <p:cNvPicPr>
+            <a:picLocks noChangeAspect="1"/>
+          </p:cNvPicPr>
+          <p:nvPr/>
+        </p:nvPicPr>
+        <p:blipFill rotWithShape="1">
+          <a:blip r:embed="rId4">
+            <a:extLst>
+              <a:ext uri="{28A0092B-C50C-407E-A947-70E740481C1C}">
+                <a14:useLocalDpi xmlns:a14="http://schemas.microsoft.com/office/drawing/2010/main" val="0"/>
+              </a:ext>
+            </a:extLst>
+          </a:blip>
+          <a:srcRect l="67222" t="1852" r="16482" b="69445"/>
+          <a:stretch/>
+        </p:blipFill>
+        <p:spPr>
+          <a:xfrm rot="18376634">
+            <a:off x="2425483" y="1452511"/>
+            <a:ext cx="1373012" cy="2418373"/>
           </a:xfrm>
           <a:prstGeom prst="rect">
             <a:avLst/>
@@ -4741,7 +4852,7 @@
     </p:spTree>
     <p:extLst>
       <p:ext uri="{BB962C8B-B14F-4D97-AF65-F5344CB8AC3E}">
-        <p14:creationId xmlns:p14="http://schemas.microsoft.com/office/powerpoint/2010/main" val="2169124541"/>
+        <p14:creationId xmlns:p14="http://schemas.microsoft.com/office/powerpoint/2010/main" val="751406779"/>
       </p:ext>
     </p:extLst>
   </p:cSld>
@@ -4807,6 +4918,72 @@
     </p:spTree>
     <p:extLst>
       <p:ext uri="{BB962C8B-B14F-4D97-AF65-F5344CB8AC3E}">
+        <p14:creationId xmlns:p14="http://schemas.microsoft.com/office/powerpoint/2010/main" val="2169124541"/>
+      </p:ext>
+    </p:extLst>
+  </p:cSld>
+  <p:clrMapOvr>
+    <a:masterClrMapping/>
+  </p:clrMapOvr>
+</p:sld>
+</file>
+
+<file path=ppt/slides/slide8.xml><?xml version="1.0" encoding="utf-8"?>
+<p:sld xmlns:a="http://schemas.openxmlformats.org/drawingml/2006/main" xmlns:r="http://schemas.openxmlformats.org/officeDocument/2006/relationships" xmlns:p="http://schemas.openxmlformats.org/presentationml/2006/main">
+  <p:cSld>
+    <p:spTree>
+      <p:nvGrpSpPr>
+        <p:cNvPr id="1" name=""/>
+        <p:cNvGrpSpPr/>
+        <p:nvPr/>
+      </p:nvGrpSpPr>
+      <p:grpSpPr>
+        <a:xfrm>
+          <a:off x="0" y="0"/>
+          <a:ext cx="0" cy="0"/>
+          <a:chOff x="0" y="0"/>
+          <a:chExt cx="0" cy="0"/>
+        </a:xfrm>
+      </p:grpSpPr>
+      <p:pic>
+        <p:nvPicPr>
+          <p:cNvPr id="5" name="Picture 4" descr="Logo&#10;&#10;Description automatically generated">
+            <a:extLst>
+              <a:ext uri="{FF2B5EF4-FFF2-40B4-BE49-F238E27FC236}">
+                <a16:creationId xmlns:a16="http://schemas.microsoft.com/office/drawing/2014/main" id="{FF910620-828E-1AC3-808E-0B4507FB12F5}"/>
+              </a:ext>
+            </a:extLst>
+          </p:cNvPr>
+          <p:cNvPicPr>
+            <a:picLocks noChangeAspect="1"/>
+          </p:cNvPicPr>
+          <p:nvPr/>
+        </p:nvPicPr>
+        <p:blipFill>
+          <a:blip r:embed="rId2">
+            <a:extLst>
+              <a:ext uri="{28A0092B-C50C-407E-A947-70E740481C1C}">
+                <a14:useLocalDpi xmlns:a14="http://schemas.microsoft.com/office/drawing/2010/main" val="0"/>
+              </a:ext>
+            </a:extLst>
+          </a:blip>
+          <a:stretch>
+            <a:fillRect/>
+          </a:stretch>
+        </p:blipFill>
+        <p:spPr>
+          <a:xfrm>
+            <a:off x="3810000" y="1039585"/>
+            <a:ext cx="4778829" cy="4778829"/>
+          </a:xfrm>
+          <a:prstGeom prst="rect">
+            <a:avLst/>
+          </a:prstGeom>
+        </p:spPr>
+      </p:pic>
+    </p:spTree>
+    <p:extLst>
+      <p:ext uri="{BB962C8B-B14F-4D97-AF65-F5344CB8AC3E}">
         <p14:creationId xmlns:p14="http://schemas.microsoft.com/office/powerpoint/2010/main" val="2084670599"/>
       </p:ext>
     </p:extLst>
@@ -4817,7 +4994,7 @@
 </p:sld>
 </file>
 
-<file path=ppt/slides/slide8.xml><?xml version="1.0" encoding="utf-8"?>
+<file path=ppt/slides/slide9.xml><?xml version="1.0" encoding="utf-8"?>
 <p:sld xmlns:a="http://schemas.openxmlformats.org/drawingml/2006/main" xmlns:r="http://schemas.openxmlformats.org/officeDocument/2006/relationships" xmlns:p="http://schemas.openxmlformats.org/presentationml/2006/main">
   <p:cSld>
     <p:spTree>

</xml_diff>